<commit_message>
update source code for ICO DApp and finished all the content of this project. Also update patterns for tutorials.
</commit_message>
<xml_diff>
--- a/以太坊教程/课件/10_MongoDB简介.pptx
+++ b/以太坊教程/课件/10_MongoDB简介.pptx
@@ -303,7 +303,7 @@
           <a:p>
             <a:fld id="{530820CF-B880-4189-942D-D702A7CBA730}" type="datetimeFigureOut">
               <a:rPr lang="zh-CN" altLang="en-US" smtClean="0"/>
-              <a:t>2018/11/13</a:t>
+              <a:t>2018/11/29</a:t>
             </a:fld>
             <a:endParaRPr lang="zh-CN" altLang="en-US"/>
           </a:p>
@@ -468,7 +468,7 @@
           <a:p>
             <a:fld id="{530820CF-B880-4189-942D-D702A7CBA730}" type="datetimeFigureOut">
               <a:rPr lang="zh-CN" altLang="en-US" smtClean="0"/>
-              <a:t>2018/11/13</a:t>
+              <a:t>2018/11/29</a:t>
             </a:fld>
             <a:endParaRPr lang="zh-CN" altLang="en-US"/>
           </a:p>
@@ -643,7 +643,7 @@
           <a:p>
             <a:fld id="{530820CF-B880-4189-942D-D702A7CBA730}" type="datetimeFigureOut">
               <a:rPr lang="zh-CN" altLang="en-US" smtClean="0"/>
-              <a:t>2018/11/13</a:t>
+              <a:t>2018/11/29</a:t>
             </a:fld>
             <a:endParaRPr lang="zh-CN" altLang="en-US"/>
           </a:p>
@@ -808,7 +808,7 @@
           <a:p>
             <a:fld id="{530820CF-B880-4189-942D-D702A7CBA730}" type="datetimeFigureOut">
               <a:rPr lang="zh-CN" altLang="en-US" smtClean="0"/>
-              <a:t>2018/11/13</a:t>
+              <a:t>2018/11/29</a:t>
             </a:fld>
             <a:endParaRPr lang="zh-CN" altLang="en-US"/>
           </a:p>
@@ -1049,7 +1049,7 @@
           <a:p>
             <a:fld id="{530820CF-B880-4189-942D-D702A7CBA730}" type="datetimeFigureOut">
               <a:rPr lang="zh-CN" altLang="en-US" smtClean="0"/>
-              <a:t>2018/11/13</a:t>
+              <a:t>2018/11/29</a:t>
             </a:fld>
             <a:endParaRPr lang="zh-CN" altLang="en-US"/>
           </a:p>
@@ -1332,7 +1332,7 @@
           <a:p>
             <a:fld id="{530820CF-B880-4189-942D-D702A7CBA730}" type="datetimeFigureOut">
               <a:rPr lang="zh-CN" altLang="en-US" smtClean="0"/>
-              <a:t>2018/11/13</a:t>
+              <a:t>2018/11/29</a:t>
             </a:fld>
             <a:endParaRPr lang="zh-CN" altLang="en-US"/>
           </a:p>
@@ -1749,7 +1749,7 @@
           <a:p>
             <a:fld id="{530820CF-B880-4189-942D-D702A7CBA730}" type="datetimeFigureOut">
               <a:rPr lang="zh-CN" altLang="en-US" smtClean="0"/>
-              <a:t>2018/11/13</a:t>
+              <a:t>2018/11/29</a:t>
             </a:fld>
             <a:endParaRPr lang="zh-CN" altLang="en-US"/>
           </a:p>
@@ -1862,7 +1862,7 @@
           <a:p>
             <a:fld id="{530820CF-B880-4189-942D-D702A7CBA730}" type="datetimeFigureOut">
               <a:rPr lang="zh-CN" altLang="en-US" smtClean="0"/>
-              <a:t>2018/11/13</a:t>
+              <a:t>2018/11/29</a:t>
             </a:fld>
             <a:endParaRPr lang="zh-CN" altLang="en-US"/>
           </a:p>
@@ -1952,7 +1952,7 @@
           <a:p>
             <a:fld id="{530820CF-B880-4189-942D-D702A7CBA730}" type="datetimeFigureOut">
               <a:rPr lang="zh-CN" altLang="en-US" smtClean="0"/>
-              <a:t>2018/11/13</a:t>
+              <a:t>2018/11/29</a:t>
             </a:fld>
             <a:endParaRPr lang="zh-CN" altLang="en-US"/>
           </a:p>
@@ -2224,7 +2224,7 @@
           <a:p>
             <a:fld id="{530820CF-B880-4189-942D-D702A7CBA730}" type="datetimeFigureOut">
               <a:rPr lang="zh-CN" altLang="en-US" smtClean="0"/>
-              <a:t>2018/11/13</a:t>
+              <a:t>2018/11/29</a:t>
             </a:fld>
             <a:endParaRPr lang="zh-CN" altLang="en-US"/>
           </a:p>
@@ -2472,7 +2472,7 @@
           <a:p>
             <a:fld id="{530820CF-B880-4189-942D-D702A7CBA730}" type="datetimeFigureOut">
               <a:rPr lang="zh-CN" altLang="en-US" smtClean="0"/>
-              <a:t>2018/11/13</a:t>
+              <a:t>2018/11/29</a:t>
             </a:fld>
             <a:endParaRPr lang="zh-CN" altLang="en-US"/>
           </a:p>
@@ -2532,9 +2532,18 @@
 <p:sldMaster xmlns:a="http://schemas.openxmlformats.org/drawingml/2006/main" xmlns:r="http://schemas.openxmlformats.org/officeDocument/2006/relationships" xmlns:p="http://schemas.openxmlformats.org/presentationml/2006/main">
   <p:cSld>
     <p:bg>
-      <p:bgRef idx="1001">
-        <a:schemeClr val="bg1"/>
-      </p:bgRef>
+      <p:bgPr>
+        <a:blipFill dpi="0" rotWithShape="1">
+          <a:blip r:embed="rId13">
+            <a:lum/>
+          </a:blip>
+          <a:srcRect/>
+          <a:stretch>
+            <a:fillRect/>
+          </a:stretch>
+        </a:blipFill>
+        <a:effectLst/>
+      </p:bgPr>
     </p:bg>
     <p:spTree>
       <p:nvGrpSpPr>
@@ -2680,7 +2689,7 @@
           <a:p>
             <a:fld id="{530820CF-B880-4189-942D-D702A7CBA730}" type="datetimeFigureOut">
               <a:rPr lang="zh-CN" altLang="en-US" smtClean="0"/>
-              <a:t>2018/11/13</a:t>
+              <a:t>2018/11/29</a:t>
             </a:fld>
             <a:endParaRPr lang="zh-CN" altLang="en-US"/>
           </a:p>
@@ -3236,7 +3245,12 @@
             <p:ph type="title"/>
           </p:nvPr>
         </p:nvSpPr>
-        <p:spPr/>
+        <p:spPr>
+          <a:xfrm>
+            <a:off x="457200" y="485800"/>
+            <a:ext cx="8229600" cy="1143000"/>
+          </a:xfrm>
+        </p:spPr>
         <p:txBody>
           <a:bodyPr>
             <a:normAutofit/>
@@ -3459,20 +3473,7 @@
                 <a:latin typeface="微软雅黑" pitchFamily="34" charset="-122"/>
                 <a:ea typeface="微软雅黑" pitchFamily="34" charset="-122"/>
               </a:rPr>
-              <a:t>( </a:t>
-            </a:r>
-            <a:r>
-              <a:rPr lang="en-US" altLang="zh-CN" sz="2400">
-                <a:solidFill>
-                  <a:schemeClr val="tx1">
-                    <a:lumMod val="75000"/>
-                    <a:lumOff val="25000"/>
-                  </a:schemeClr>
-                </a:solidFill>
-                <a:latin typeface="微软雅黑" pitchFamily="34" charset="-122"/>
-                <a:ea typeface="微软雅黑" pitchFamily="34" charset="-122"/>
-              </a:rPr>
-              <a:t>document </a:t>
+              <a:t>( document </a:t>
             </a:r>
             <a:r>
               <a:rPr lang="en-US" altLang="zh-CN" sz="2400" smtClean="0">
@@ -3630,7 +3631,12 @@
             <p:ph type="title"/>
           </p:nvPr>
         </p:nvSpPr>
-        <p:spPr/>
+        <p:spPr>
+          <a:xfrm>
+            <a:off x="457200" y="404664"/>
+            <a:ext cx="8229600" cy="1143000"/>
+          </a:xfrm>
+        </p:spPr>
         <p:txBody>
           <a:bodyPr>
             <a:normAutofit/>
@@ -3650,21 +3656,7 @@
                 <a:ea typeface="微软雅黑" pitchFamily="34" charset="-122"/>
                 <a:cs typeface="+mn-cs"/>
               </a:rPr>
-              <a:t>  文档</a:t>
-            </a:r>
-            <a:r>
-              <a:rPr lang="zh-CN" altLang="en-US" sz="3200" smtClean="0">
-                <a:solidFill>
-                  <a:schemeClr val="tx1">
-                    <a:lumMod val="75000"/>
-                    <a:lumOff val="25000"/>
-                  </a:schemeClr>
-                </a:solidFill>
-                <a:latin typeface="微软雅黑" pitchFamily="34" charset="-122"/>
-                <a:ea typeface="微软雅黑" pitchFamily="34" charset="-122"/>
-                <a:cs typeface="+mn-cs"/>
-              </a:rPr>
-              <a:t>操作 </a:t>
+              <a:t>  文档操作 </a:t>
             </a:r>
             <a:r>
               <a:rPr lang="en-US" altLang="zh-CN" sz="3200" smtClean="0">
@@ -4126,20 +4118,7 @@
                 <a:latin typeface="微软雅黑" pitchFamily="34" charset="-122"/>
                 <a:ea typeface="微软雅黑" pitchFamily="34" charset="-122"/>
               </a:rPr>
-              <a:t>（可选）抛出异常的</a:t>
-            </a:r>
-            <a:r>
-              <a:rPr lang="zh-CN" altLang="en-US">
-                <a:solidFill>
-                  <a:schemeClr val="tx1">
-                    <a:lumMod val="75000"/>
-                    <a:lumOff val="25000"/>
-                  </a:schemeClr>
-                </a:solidFill>
-                <a:latin typeface="微软雅黑" pitchFamily="34" charset="-122"/>
-                <a:ea typeface="微软雅黑" pitchFamily="34" charset="-122"/>
-              </a:rPr>
-              <a:t>级别</a:t>
+              <a:t>（可选）抛出异常的级别</a:t>
             </a:r>
             <a:r>
               <a:rPr lang="zh-CN" altLang="en-US" smtClean="0">
@@ -4185,31 +4164,8 @@
                 <a:latin typeface="微软雅黑" pitchFamily="34" charset="-122"/>
                 <a:ea typeface="微软雅黑" pitchFamily="34" charset="-122"/>
               </a:rPr>
-              <a:t>&gt; </a:t>
-            </a:r>
-            <a:r>
-              <a:rPr lang="en-US" altLang="zh-CN">
-                <a:solidFill>
-                  <a:schemeClr val="tx1">
-                    <a:lumMod val="75000"/>
-                    <a:lumOff val="25000"/>
-                  </a:schemeClr>
-                </a:solidFill>
-                <a:latin typeface="微软雅黑" pitchFamily="34" charset="-122"/>
-                <a:ea typeface="微软雅黑" pitchFamily="34" charset="-122"/>
-              </a:rPr>
-              <a:t>db.COLLECTION_NAME.remove({})</a:t>
-            </a:r>
-            <a:endParaRPr lang="en-US" altLang="zh-CN">
-              <a:solidFill>
-                <a:schemeClr val="tx1">
-                  <a:lumMod val="75000"/>
-                  <a:lumOff val="25000"/>
-                </a:schemeClr>
-              </a:solidFill>
-              <a:latin typeface="微软雅黑" pitchFamily="34" charset="-122"/>
-              <a:ea typeface="微软雅黑" pitchFamily="34" charset="-122"/>
-            </a:endParaRPr>
+              <a:t>&gt; db.COLLECTION_NAME.remove({})</a:t>
+            </a:r>
           </a:p>
           <a:p>
             <a:pPr lvl="1" latinLnBrk="1">
@@ -4280,7 +4236,12 @@
             <p:ph type="title"/>
           </p:nvPr>
         </p:nvSpPr>
-        <p:spPr/>
+        <p:spPr>
+          <a:xfrm>
+            <a:off x="446856" y="341784"/>
+            <a:ext cx="8229600" cy="1143000"/>
+          </a:xfrm>
+        </p:spPr>
         <p:txBody>
           <a:bodyPr>
             <a:normAutofit/>
@@ -4289,7 +4250,7 @@
           <a:p>
             <a:pPr algn="l"/>
             <a:r>
-              <a:rPr lang="zh-CN" altLang="en-US" sz="3200" smtClean="0">
+              <a:rPr lang="zh-CN" altLang="en-US" sz="2800" smtClean="0">
                 <a:solidFill>
                   <a:schemeClr val="tx1">
                     <a:lumMod val="75000"/>
@@ -4300,10 +4261,10 @@
                 <a:ea typeface="微软雅黑" pitchFamily="34" charset="-122"/>
                 <a:cs typeface="+mn-cs"/>
               </a:rPr>
-              <a:t>  文档</a:t>
-            </a:r>
-            <a:r>
-              <a:rPr lang="zh-CN" altLang="en-US" sz="3200" smtClean="0">
+              <a:t>  文档操作 </a:t>
+            </a:r>
+            <a:r>
+              <a:rPr lang="en-US" altLang="zh-CN" sz="2800" smtClean="0">
                 <a:solidFill>
                   <a:schemeClr val="tx1">
                     <a:lumMod val="75000"/>
@@ -4314,24 +4275,10 @@
                 <a:ea typeface="微软雅黑" pitchFamily="34" charset="-122"/>
                 <a:cs typeface="+mn-cs"/>
               </a:rPr>
-              <a:t>操作 </a:t>
-            </a:r>
-            <a:r>
-              <a:rPr lang="en-US" altLang="zh-CN" sz="3200" smtClean="0">
-                <a:solidFill>
-                  <a:schemeClr val="tx1">
-                    <a:lumMod val="75000"/>
-                    <a:lumOff val="25000"/>
-                  </a:schemeClr>
-                </a:solidFill>
-                <a:latin typeface="微软雅黑" pitchFamily="34" charset="-122"/>
-                <a:ea typeface="微软雅黑" pitchFamily="34" charset="-122"/>
-                <a:cs typeface="+mn-cs"/>
-              </a:rPr>
               <a:t>—— </a:t>
             </a:r>
             <a:r>
-              <a:rPr lang="zh-CN" altLang="en-US" sz="3200" smtClean="0">
+              <a:rPr lang="zh-CN" altLang="en-US" sz="2800" smtClean="0">
                 <a:solidFill>
                   <a:schemeClr val="tx1">
                     <a:lumMod val="75000"/>
@@ -4344,7 +4291,7 @@
               <a:t>更新</a:t>
             </a:r>
             <a:r>
-              <a:rPr lang="zh-CN" altLang="en-US" sz="3200">
+              <a:rPr lang="zh-CN" altLang="en-US" sz="2800">
                 <a:solidFill>
                   <a:schemeClr val="tx1">
                     <a:lumMod val="75000"/>
@@ -4357,7 +4304,7 @@
               <a:t>文档（</a:t>
             </a:r>
             <a:r>
-              <a:rPr lang="en-US" altLang="zh-CN" sz="3200">
+              <a:rPr lang="en-US" altLang="zh-CN" sz="2800">
                 <a:solidFill>
                   <a:schemeClr val="tx1">
                     <a:lumMod val="75000"/>
@@ -4370,7 +4317,7 @@
               <a:t>Update</a:t>
             </a:r>
             <a:r>
-              <a:rPr lang="zh-CN" altLang="en-US" sz="3200">
+              <a:rPr lang="zh-CN" altLang="en-US" sz="2800">
                 <a:solidFill>
                   <a:schemeClr val="tx1">
                     <a:lumMod val="75000"/>
@@ -4383,7 +4330,7 @@
               <a:t>，</a:t>
             </a:r>
             <a:r>
-              <a:rPr lang="en-US" altLang="zh-CN" sz="3200">
+              <a:rPr lang="en-US" altLang="zh-CN" sz="2800">
                 <a:solidFill>
                   <a:schemeClr val="tx1">
                     <a:lumMod val="75000"/>
@@ -4396,7 +4343,7 @@
               <a:t>U</a:t>
             </a:r>
             <a:r>
-              <a:rPr lang="zh-CN" altLang="en-US" sz="3200" smtClean="0">
+              <a:rPr lang="zh-CN" altLang="en-US" sz="2800" smtClean="0">
                 <a:solidFill>
                   <a:schemeClr val="tx1">
                     <a:lumMod val="75000"/>
@@ -4408,7 +4355,7 @@
               </a:rPr>
               <a:t>）</a:t>
             </a:r>
-            <a:endParaRPr lang="zh-CN" altLang="en-US" sz="3200" dirty="0">
+            <a:endParaRPr lang="zh-CN" altLang="en-US" sz="2800" dirty="0">
               <a:solidFill>
                 <a:schemeClr val="tx1">
                   <a:lumMod val="75000"/>
@@ -4459,7 +4406,20 @@
                 <a:latin typeface="微软雅黑" pitchFamily="34" charset="-122"/>
                 <a:ea typeface="微软雅黑" pitchFamily="34" charset="-122"/>
               </a:rPr>
-              <a:t>&gt; db.COLLECTION_NAME.update(</a:t>
+              <a:t>&gt; db.COLLECTION_NAME.update( &lt;</a:t>
+            </a:r>
+            <a:r>
+              <a:rPr lang="en-US" altLang="zh-CN" sz="1500">
+                <a:solidFill>
+                  <a:schemeClr val="tx1">
+                    <a:lumMod val="75000"/>
+                    <a:lumOff val="25000"/>
+                  </a:schemeClr>
+                </a:solidFill>
+                <a:latin typeface="微软雅黑" pitchFamily="34" charset="-122"/>
+                <a:ea typeface="微软雅黑" pitchFamily="34" charset="-122"/>
+              </a:rPr>
+              <a:t>query</a:t>
             </a:r>
             <a:r>
               <a:rPr lang="en-US" altLang="zh-CN" sz="1500" smtClean="0">
@@ -4472,72 +4432,7 @@
                 <a:latin typeface="微软雅黑" pitchFamily="34" charset="-122"/>
                 <a:ea typeface="微软雅黑" pitchFamily="34" charset="-122"/>
               </a:rPr>
-              <a:t> </a:t>
-            </a:r>
-            <a:r>
-              <a:rPr lang="en-US" altLang="zh-CN" sz="1500" smtClean="0">
-                <a:solidFill>
-                  <a:schemeClr val="tx1">
-                    <a:lumMod val="75000"/>
-                    <a:lumOff val="25000"/>
-                  </a:schemeClr>
-                </a:solidFill>
-                <a:latin typeface="微软雅黑" pitchFamily="34" charset="-122"/>
-                <a:ea typeface="微软雅黑" pitchFamily="34" charset="-122"/>
-              </a:rPr>
-              <a:t>&lt;</a:t>
-            </a:r>
-            <a:r>
-              <a:rPr lang="en-US" altLang="zh-CN" sz="1500">
-                <a:solidFill>
-                  <a:schemeClr val="tx1">
-                    <a:lumMod val="75000"/>
-                    <a:lumOff val="25000"/>
-                  </a:schemeClr>
-                </a:solidFill>
-                <a:latin typeface="微软雅黑" pitchFamily="34" charset="-122"/>
-                <a:ea typeface="微软雅黑" pitchFamily="34" charset="-122"/>
-              </a:rPr>
-              <a:t>query</a:t>
-            </a:r>
-            <a:r>
-              <a:rPr lang="en-US" altLang="zh-CN" sz="1500" smtClean="0">
-                <a:solidFill>
-                  <a:schemeClr val="tx1">
-                    <a:lumMod val="75000"/>
-                    <a:lumOff val="25000"/>
-                  </a:schemeClr>
-                </a:solidFill>
-                <a:latin typeface="微软雅黑" pitchFamily="34" charset="-122"/>
-                <a:ea typeface="微软雅黑" pitchFamily="34" charset="-122"/>
-              </a:rPr>
-              <a:t>&gt;,</a:t>
-            </a:r>
-            <a:r>
-              <a:rPr lang="en-US" altLang="zh-CN" sz="1500" smtClean="0">
-                <a:solidFill>
-                  <a:schemeClr val="tx1">
-                    <a:lumMod val="75000"/>
-                    <a:lumOff val="25000"/>
-                  </a:schemeClr>
-                </a:solidFill>
-                <a:latin typeface="微软雅黑" pitchFamily="34" charset="-122"/>
-                <a:ea typeface="微软雅黑" pitchFamily="34" charset="-122"/>
-              </a:rPr>
-              <a:t> </a:t>
-            </a:r>
-            <a:r>
-              <a:rPr lang="en-US" altLang="zh-CN" sz="1500" smtClean="0">
-                <a:solidFill>
-                  <a:schemeClr val="tx1">
-                    <a:lumMod val="75000"/>
-                    <a:lumOff val="25000"/>
-                  </a:schemeClr>
-                </a:solidFill>
-                <a:latin typeface="微软雅黑" pitchFamily="34" charset="-122"/>
-                <a:ea typeface="微软雅黑" pitchFamily="34" charset="-122"/>
-              </a:rPr>
-              <a:t>&lt;</a:t>
+              <a:t>&gt;, &lt;</a:t>
             </a:r>
             <a:r>
               <a:rPr lang="en-US" altLang="zh-CN" sz="1500">
@@ -4651,20 +4546,7 @@
                 <a:latin typeface="微软雅黑" pitchFamily="34" charset="-122"/>
                 <a:ea typeface="微软雅黑" pitchFamily="34" charset="-122"/>
               </a:rPr>
-              <a:t>	  writeConcern: &lt;document</a:t>
-            </a:r>
-            <a:r>
-              <a:rPr lang="en-US" altLang="zh-CN" sz="1500">
-                <a:solidFill>
-                  <a:schemeClr val="tx1">
-                    <a:lumMod val="75000"/>
-                    <a:lumOff val="25000"/>
-                  </a:schemeClr>
-                </a:solidFill>
-                <a:latin typeface="微软雅黑" pitchFamily="34" charset="-122"/>
-                <a:ea typeface="微软雅黑" pitchFamily="34" charset="-122"/>
-              </a:rPr>
-              <a:t>&gt; </a:t>
+              <a:t>	  writeConcern: &lt;document&gt; </a:t>
             </a:r>
             <a:r>
               <a:rPr lang="en-US" altLang="zh-CN" sz="1500" smtClean="0">
@@ -4715,20 +4597,7 @@
                 <a:latin typeface="微软雅黑" pitchFamily="34" charset="-122"/>
                 <a:ea typeface="微软雅黑" pitchFamily="34" charset="-122"/>
               </a:rPr>
-              <a:t>的</a:t>
-            </a:r>
-            <a:r>
-              <a:rPr lang="zh-CN" altLang="en-US" sz="1500">
-                <a:solidFill>
-                  <a:schemeClr val="tx1">
-                    <a:lumMod val="75000"/>
-                    <a:lumOff val="25000"/>
-                  </a:schemeClr>
-                </a:solidFill>
-                <a:latin typeface="微软雅黑" pitchFamily="34" charset="-122"/>
-                <a:ea typeface="微软雅黑" pitchFamily="34" charset="-122"/>
-              </a:rPr>
-              <a:t>查询</a:t>
+              <a:t>的查询</a:t>
             </a:r>
             <a:r>
               <a:rPr lang="zh-CN" altLang="en-US" sz="1500" smtClean="0">
@@ -4789,20 +4658,7 @@
                 <a:latin typeface="微软雅黑" pitchFamily="34" charset="-122"/>
                 <a:ea typeface="微软雅黑" pitchFamily="34" charset="-122"/>
               </a:rPr>
-              <a:t>的对象和一些更新的操作符</a:t>
-            </a:r>
-            <a:r>
-              <a:rPr lang="zh-CN" altLang="en-US" sz="1500">
-                <a:solidFill>
-                  <a:schemeClr val="tx1">
-                    <a:lumMod val="75000"/>
-                    <a:lumOff val="25000"/>
-                  </a:schemeClr>
-                </a:solidFill>
-                <a:latin typeface="微软雅黑" pitchFamily="34" charset="-122"/>
-                <a:ea typeface="微软雅黑" pitchFamily="34" charset="-122"/>
-              </a:rPr>
-              <a:t>（</a:t>
+              <a:t>的对象和一些更新的操作符（</a:t>
             </a:r>
             <a:r>
               <a:rPr lang="zh-CN" altLang="en-US" sz="1500" smtClean="0">
@@ -4928,20 +4784,7 @@
                 <a:latin typeface="微软雅黑" pitchFamily="34" charset="-122"/>
                 <a:ea typeface="微软雅黑" pitchFamily="34" charset="-122"/>
               </a:rPr>
-              <a:t>的记录，</a:t>
-            </a:r>
-            <a:r>
-              <a:rPr lang="zh-CN" altLang="en-US" sz="1500">
-                <a:solidFill>
-                  <a:schemeClr val="tx1">
-                    <a:lumMod val="75000"/>
-                    <a:lumOff val="25000"/>
-                  </a:schemeClr>
-                </a:solidFill>
-                <a:latin typeface="微软雅黑" pitchFamily="34" charset="-122"/>
-                <a:ea typeface="微软雅黑" pitchFamily="34" charset="-122"/>
-              </a:rPr>
-              <a:t>是否</a:t>
+              <a:t>的记录，是否</a:t>
             </a:r>
             <a:r>
               <a:rPr lang="zh-CN" altLang="en-US" sz="1500" smtClean="0">
@@ -5173,20 +5016,7 @@
                 <a:latin typeface="微软雅黑" pitchFamily="34" charset="-122"/>
                 <a:ea typeface="微软雅黑" pitchFamily="34" charset="-122"/>
               </a:rPr>
-              <a:t>可选，抛出异常的</a:t>
-            </a:r>
-            <a:r>
-              <a:rPr lang="zh-CN" altLang="en-US" sz="1500">
-                <a:solidFill>
-                  <a:schemeClr val="tx1">
-                    <a:lumMod val="75000"/>
-                    <a:lumOff val="25000"/>
-                  </a:schemeClr>
-                </a:solidFill>
-                <a:latin typeface="微软雅黑" pitchFamily="34" charset="-122"/>
-                <a:ea typeface="微软雅黑" pitchFamily="34" charset="-122"/>
-              </a:rPr>
-              <a:t>级别</a:t>
+              <a:t>可选，抛出异常的级别</a:t>
             </a:r>
             <a:r>
               <a:rPr lang="zh-CN" altLang="en-US" sz="1500" smtClean="0">
@@ -5267,187 +5097,8 @@
                 <a:latin typeface="微软雅黑" pitchFamily="34" charset="-122"/>
                 <a:ea typeface="微软雅黑" pitchFamily="34" charset="-122"/>
               </a:rPr>
-              <a:t>&gt; db.COLLECTION_NAME.save</a:t>
-            </a:r>
-            <a:r>
-              <a:rPr lang="en-US" altLang="zh-CN" sz="1500">
-                <a:solidFill>
-                  <a:schemeClr val="tx1">
-                    <a:lumMod val="75000"/>
-                    <a:lumOff val="25000"/>
-                  </a:schemeClr>
-                </a:solidFill>
-                <a:latin typeface="微软雅黑" pitchFamily="34" charset="-122"/>
-                <a:ea typeface="微软雅黑" pitchFamily="34" charset="-122"/>
-              </a:rPr>
-              <a:t>(</a:t>
-            </a:r>
-            <a:r>
-              <a:rPr lang="en-US" altLang="zh-CN" sz="1500">
-                <a:solidFill>
-                  <a:schemeClr val="tx1">
-                    <a:lumMod val="75000"/>
-                    <a:lumOff val="25000"/>
-                  </a:schemeClr>
-                </a:solidFill>
-                <a:latin typeface="微软雅黑" pitchFamily="34" charset="-122"/>
-                <a:ea typeface="微软雅黑" pitchFamily="34" charset="-122"/>
-              </a:rPr>
-              <a:t> </a:t>
-            </a:r>
-            <a:r>
-              <a:rPr lang="en-US" altLang="zh-CN" sz="1500">
-                <a:solidFill>
-                  <a:schemeClr val="tx1">
-                    <a:lumMod val="75000"/>
-                    <a:lumOff val="25000"/>
-                  </a:schemeClr>
-                </a:solidFill>
-                <a:latin typeface="微软雅黑" pitchFamily="34" charset="-122"/>
-                <a:ea typeface="微软雅黑" pitchFamily="34" charset="-122"/>
-              </a:rPr>
-              <a:t>&lt;</a:t>
-            </a:r>
-            <a:r>
-              <a:rPr lang="en-US" altLang="zh-CN" sz="1500">
-                <a:solidFill>
-                  <a:schemeClr val="tx1">
-                    <a:lumMod val="75000"/>
-                    <a:lumOff val="25000"/>
-                  </a:schemeClr>
-                </a:solidFill>
-                <a:latin typeface="微软雅黑" pitchFamily="34" charset="-122"/>
-                <a:ea typeface="微软雅黑" pitchFamily="34" charset="-122"/>
-              </a:rPr>
-              <a:t>document</a:t>
-            </a:r>
-            <a:r>
-              <a:rPr lang="en-US" altLang="zh-CN" sz="1500">
-                <a:solidFill>
-                  <a:schemeClr val="tx1">
-                    <a:lumMod val="75000"/>
-                    <a:lumOff val="25000"/>
-                  </a:schemeClr>
-                </a:solidFill>
-                <a:latin typeface="微软雅黑" pitchFamily="34" charset="-122"/>
-                <a:ea typeface="微软雅黑" pitchFamily="34" charset="-122"/>
-              </a:rPr>
-              <a:t>&gt;,</a:t>
-            </a:r>
-            <a:r>
-              <a:rPr lang="en-US" altLang="zh-CN" sz="1500">
-                <a:solidFill>
-                  <a:schemeClr val="tx1">
-                    <a:lumMod val="75000"/>
-                    <a:lumOff val="25000"/>
-                  </a:schemeClr>
-                </a:solidFill>
-                <a:latin typeface="微软雅黑" pitchFamily="34" charset="-122"/>
-                <a:ea typeface="微软雅黑" pitchFamily="34" charset="-122"/>
-              </a:rPr>
-              <a:t> </a:t>
-            </a:r>
-            <a:r>
-              <a:rPr lang="en-US" altLang="zh-CN" sz="1500">
-                <a:solidFill>
-                  <a:schemeClr val="tx1">
-                    <a:lumMod val="75000"/>
-                    <a:lumOff val="25000"/>
-                  </a:schemeClr>
-                </a:solidFill>
-                <a:latin typeface="微软雅黑" pitchFamily="34" charset="-122"/>
-                <a:ea typeface="微软雅黑" pitchFamily="34" charset="-122"/>
-              </a:rPr>
-              <a:t>{</a:t>
-            </a:r>
-            <a:r>
-              <a:rPr lang="en-US" altLang="zh-CN" sz="1500">
-                <a:solidFill>
-                  <a:schemeClr val="tx1">
-                    <a:lumMod val="75000"/>
-                    <a:lumOff val="25000"/>
-                  </a:schemeClr>
-                </a:solidFill>
-                <a:latin typeface="微软雅黑" pitchFamily="34" charset="-122"/>
-                <a:ea typeface="微软雅黑" pitchFamily="34" charset="-122"/>
-              </a:rPr>
-              <a:t> </a:t>
-            </a:r>
-            <a:r>
-              <a:rPr lang="en-US" altLang="zh-CN" sz="1500">
-                <a:solidFill>
-                  <a:schemeClr val="tx1">
-                    <a:lumMod val="75000"/>
-                    <a:lumOff val="25000"/>
-                  </a:schemeClr>
-                </a:solidFill>
-                <a:latin typeface="微软雅黑" pitchFamily="34" charset="-122"/>
-                <a:ea typeface="微软雅黑" pitchFamily="34" charset="-122"/>
-              </a:rPr>
-              <a:t>writeConcern</a:t>
-            </a:r>
-            <a:r>
-              <a:rPr lang="en-US" altLang="zh-CN" sz="1500">
-                <a:solidFill>
-                  <a:schemeClr val="tx1">
-                    <a:lumMod val="75000"/>
-                    <a:lumOff val="25000"/>
-                  </a:schemeClr>
-                </a:solidFill>
-                <a:latin typeface="微软雅黑" pitchFamily="34" charset="-122"/>
-                <a:ea typeface="微软雅黑" pitchFamily="34" charset="-122"/>
-              </a:rPr>
-              <a:t>: &lt;document</a:t>
-            </a:r>
-            <a:r>
-              <a:rPr lang="en-US" altLang="zh-CN" sz="1500">
-                <a:solidFill>
-                  <a:schemeClr val="tx1">
-                    <a:lumMod val="75000"/>
-                    <a:lumOff val="25000"/>
-                  </a:schemeClr>
-                </a:solidFill>
-                <a:latin typeface="微软雅黑" pitchFamily="34" charset="-122"/>
-                <a:ea typeface="微软雅黑" pitchFamily="34" charset="-122"/>
-              </a:rPr>
-              <a:t>&gt;</a:t>
-            </a:r>
-            <a:r>
-              <a:rPr lang="en-US" altLang="zh-CN" sz="1500">
-                <a:solidFill>
-                  <a:schemeClr val="tx1">
-                    <a:lumMod val="75000"/>
-                    <a:lumOff val="25000"/>
-                  </a:schemeClr>
-                </a:solidFill>
-                <a:latin typeface="微软雅黑" pitchFamily="34" charset="-122"/>
-                <a:ea typeface="微软雅黑" pitchFamily="34" charset="-122"/>
-              </a:rPr>
-              <a:t> </a:t>
-            </a:r>
-            <a:r>
-              <a:rPr lang="en-US" altLang="zh-CN" sz="1500">
-                <a:solidFill>
-                  <a:schemeClr val="tx1">
-                    <a:lumMod val="75000"/>
-                    <a:lumOff val="25000"/>
-                  </a:schemeClr>
-                </a:solidFill>
-                <a:latin typeface="微软雅黑" pitchFamily="34" charset="-122"/>
-                <a:ea typeface="微软雅黑" pitchFamily="34" charset="-122"/>
-              </a:rPr>
-              <a:t>} )</a:t>
-            </a:r>
-            <a:endParaRPr lang="en-US" altLang="zh-CN" sz="1500">
-              <a:solidFill>
-                <a:schemeClr val="tx1">
-                  <a:lumMod val="75000"/>
-                  <a:lumOff val="25000"/>
-                </a:schemeClr>
-              </a:solidFill>
-              <a:latin typeface="微软雅黑" pitchFamily="34" charset="-122"/>
-              <a:ea typeface="微软雅黑" pitchFamily="34" charset="-122"/>
-            </a:endParaRPr>
+              <a:t>&gt; db.COLLECTION_NAME.save( &lt;document&gt;, { writeConcern: &lt;document&gt; } )</a:t>
+            </a:r>
           </a:p>
         </p:txBody>
       </p:sp>
@@ -5498,7 +5149,12 @@
             <p:ph type="title"/>
           </p:nvPr>
         </p:nvSpPr>
-        <p:spPr/>
+        <p:spPr>
+          <a:xfrm>
+            <a:off x="457200" y="404664"/>
+            <a:ext cx="8229600" cy="1143000"/>
+          </a:xfrm>
+        </p:spPr>
         <p:txBody>
           <a:bodyPr>
             <a:normAutofit/>
@@ -5518,21 +5174,7 @@
                 <a:ea typeface="微软雅黑" pitchFamily="34" charset="-122"/>
                 <a:cs typeface="+mn-cs"/>
               </a:rPr>
-              <a:t>  文档</a:t>
-            </a:r>
-            <a:r>
-              <a:rPr lang="zh-CN" altLang="en-US" sz="3200" smtClean="0">
-                <a:solidFill>
-                  <a:schemeClr val="tx1">
-                    <a:lumMod val="75000"/>
-                    <a:lumOff val="25000"/>
-                  </a:schemeClr>
-                </a:solidFill>
-                <a:latin typeface="微软雅黑" pitchFamily="34" charset="-122"/>
-                <a:ea typeface="微软雅黑" pitchFamily="34" charset="-122"/>
-                <a:cs typeface="+mn-cs"/>
-              </a:rPr>
-              <a:t>操作 </a:t>
+              <a:t>  文档操作 </a:t>
             </a:r>
             <a:r>
               <a:rPr lang="en-US" altLang="zh-CN" sz="3200" smtClean="0">
@@ -5677,20 +5319,7 @@
                 <a:latin typeface="微软雅黑" pitchFamily="34" charset="-122"/>
                 <a:ea typeface="微软雅黑" pitchFamily="34" charset="-122"/>
               </a:rPr>
-              <a:t>( query, </a:t>
-            </a:r>
-            <a:r>
-              <a:rPr lang="en-US" altLang="zh-CN" sz="2400">
-                <a:solidFill>
-                  <a:schemeClr val="tx1">
-                    <a:lumMod val="75000"/>
-                    <a:lumOff val="25000"/>
-                  </a:schemeClr>
-                </a:solidFill>
-                <a:latin typeface="微软雅黑" pitchFamily="34" charset="-122"/>
-                <a:ea typeface="微软雅黑" pitchFamily="34" charset="-122"/>
-              </a:rPr>
-              <a:t>projection </a:t>
+              <a:t>( query, projection </a:t>
             </a:r>
             <a:r>
               <a:rPr lang="en-US" altLang="zh-CN" sz="2400" smtClean="0">
@@ -5769,20 +5398,7 @@
                 <a:latin typeface="微软雅黑" pitchFamily="34" charset="-122"/>
                 <a:ea typeface="微软雅黑" pitchFamily="34" charset="-122"/>
               </a:rPr>
-              <a:t> ：可选，使用投影操作符指定返回的键。查询时返回文档中所有键值， 只需省略该参数即可（默认</a:t>
-            </a:r>
-            <a:r>
-              <a:rPr lang="zh-CN" altLang="en-US" sz="2000">
-                <a:solidFill>
-                  <a:schemeClr val="tx1">
-                    <a:lumMod val="75000"/>
-                    <a:lumOff val="25000"/>
-                  </a:schemeClr>
-                </a:solidFill>
-                <a:latin typeface="微软雅黑" pitchFamily="34" charset="-122"/>
-                <a:ea typeface="微软雅黑" pitchFamily="34" charset="-122"/>
-              </a:rPr>
-              <a:t>省略</a:t>
+              <a:t> ：可选，使用投影操作符指定返回的键。查询时返回文档中所有键值， 只需省略该参数即可（默认省略</a:t>
             </a:r>
             <a:r>
               <a:rPr lang="zh-CN" altLang="en-US" sz="2000" smtClean="0">
@@ -5966,7 +5582,12 @@
             <p:ph type="title"/>
           </p:nvPr>
         </p:nvSpPr>
-        <p:spPr/>
+        <p:spPr>
+          <a:xfrm>
+            <a:off x="457200" y="404664"/>
+            <a:ext cx="8229600" cy="1143000"/>
+          </a:xfrm>
+        </p:spPr>
         <p:txBody>
           <a:bodyPr>
             <a:normAutofit/>
@@ -6170,11 +5791,7 @@
             </a:r>
             <a:r>
               <a:rPr lang="en-US" altLang="zh-CN" sz="2000"/>
-              <a:t> db.COLLECTION_NAME.find</a:t>
-            </a:r>
-            <a:r>
-              <a:rPr lang="en-US" altLang="zh-CN" sz="2000"/>
-              <a:t>({key1:value1, key2:value2})</a:t>
+              <a:t> db.COLLECTION_NAME.find({key1:value1, key2:value2})</a:t>
             </a:r>
             <a:endParaRPr lang="en-US" altLang="zh-CN" sz="2000" smtClean="0"/>
           </a:p>
@@ -6221,31 +5838,7 @@
             </a:pPr>
             <a:r>
               <a:rPr lang="en-US" altLang="zh-CN" sz="2000"/>
-              <a:t>&gt;</a:t>
-            </a:r>
-            <a:r>
-              <a:rPr lang="en-US" altLang="zh-CN" sz="2000"/>
-              <a:t> </a:t>
-            </a:r>
-            <a:r>
-              <a:rPr lang="en-US" altLang="zh-CN" sz="2000"/>
-              <a:t>db.COLLECTION_NAME.find</a:t>
-            </a:r>
-            <a:r>
-              <a:rPr lang="en-US" altLang="zh-CN" sz="2000"/>
-              <a:t>( { $or: </a:t>
-            </a:r>
-            <a:r>
-              <a:rPr lang="en-US" altLang="zh-CN" sz="2000"/>
-              <a:t>[ </a:t>
-            </a:r>
-            <a:r>
-              <a:rPr lang="en-US" altLang="zh-CN" sz="2000"/>
-              <a:t>{key1: value1}, {key2:value2} ] } </a:t>
-            </a:r>
-            <a:r>
-              <a:rPr lang="en-US" altLang="zh-CN" sz="2000"/>
-              <a:t>)</a:t>
+              <a:t>&gt; db.COLLECTION_NAME.find( { $or: [ {key1: value1}, {key2:value2} ] } )</a:t>
             </a:r>
           </a:p>
           <a:p>
@@ -6308,11 +5901,7 @@
             </a:r>
             <a:r>
               <a:rPr lang="en-US" altLang="zh-CN" sz="2000"/>
-              <a:t>$or</a:t>
-            </a:r>
-            <a:r>
-              <a:rPr lang="en-US" altLang="zh-CN" sz="2000"/>
-              <a:t>: </a:t>
+              <a:t>$or: </a:t>
             </a:r>
             <a:r>
               <a:rPr lang="en-US" altLang="zh-CN" sz="2000" smtClean="0"/>
@@ -6414,7 +6003,12 @@
             <p:ph type="title"/>
           </p:nvPr>
         </p:nvSpPr>
-        <p:spPr/>
+        <p:spPr>
+          <a:xfrm>
+            <a:off x="457200" y="413792"/>
+            <a:ext cx="8229600" cy="1143000"/>
+          </a:xfrm>
+        </p:spPr>
         <p:txBody>
           <a:bodyPr>
             <a:normAutofit/>
@@ -6558,11 +6152,7 @@
             </a:r>
             <a:r>
               <a:rPr lang="zh-CN" altLang="en-US"/>
-              <a:t>方法对数据进行</a:t>
-            </a:r>
-            <a:r>
-              <a:rPr lang="zh-CN" altLang="en-US"/>
-              <a:t>排序</a:t>
+              <a:t>方法对数据进行排序</a:t>
             </a:r>
             <a:r>
               <a:rPr lang="zh-CN" altLang="en-US" smtClean="0"/>
@@ -6602,11 +6192,7 @@
             </a:r>
             <a:r>
               <a:rPr lang="zh-CN" altLang="en-US"/>
-              <a:t>是</a:t>
-            </a:r>
-            <a:r>
-              <a:rPr lang="zh-CN" altLang="en-US"/>
-              <a:t>用于</a:t>
+              <a:t>是用于</a:t>
             </a:r>
             <a:r>
               <a:rPr lang="zh-CN" altLang="en-US" smtClean="0"/>
@@ -6626,11 +6212,7 @@
             </a:r>
             <a:r>
               <a:rPr lang="en-US" altLang="zh-CN"/>
-              <a:t>().sort({</a:t>
-            </a:r>
-            <a:r>
-              <a:rPr lang="en-US" altLang="zh-CN"/>
-              <a:t>KEY:1</a:t>
+              <a:t>().sort({KEY:1</a:t>
             </a:r>
             <a:r>
               <a:rPr lang="en-US" altLang="zh-CN" smtClean="0"/>
@@ -6679,11 +6261,7 @@
             </a:r>
             <a:r>
               <a:rPr lang="zh-CN" altLang="en-US"/>
-              <a:t>方法来</a:t>
-            </a:r>
-            <a:r>
-              <a:rPr lang="zh-CN" altLang="en-US"/>
-              <a:t>创建</a:t>
+              <a:t>方法来创建</a:t>
             </a:r>
             <a:r>
               <a:rPr lang="zh-CN" altLang="en-US" smtClean="0"/>
@@ -6763,11 +6341,7 @@
             </a:r>
             <a:r>
               <a:rPr lang="en-US" altLang="zh-CN"/>
-              <a:t>-</a:t>
-            </a:r>
-            <a:r>
-              <a:rPr lang="en-US" altLang="zh-CN"/>
-              <a:t>1 </a:t>
+              <a:t>-1 </a:t>
             </a:r>
             <a:r>
               <a:rPr lang="zh-CN" altLang="en-US" smtClean="0"/>
@@ -6965,7 +6539,12 @@
             <p:ph type="title"/>
           </p:nvPr>
         </p:nvSpPr>
-        <p:spPr/>
+        <p:spPr>
+          <a:xfrm>
+            <a:off x="457200" y="485800"/>
+            <a:ext cx="8229600" cy="1143000"/>
+          </a:xfrm>
+        </p:spPr>
         <p:txBody>
           <a:bodyPr>
             <a:normAutofit/>
@@ -6998,20 +6577,7 @@
                 <a:latin typeface="微软雅黑" pitchFamily="34" charset="-122"/>
                 <a:ea typeface="微软雅黑" pitchFamily="34" charset="-122"/>
               </a:rPr>
-              <a:t> </a:t>
-            </a:r>
-            <a:r>
-              <a:rPr lang="en-US" altLang="zh-CN" sz="3200" smtClean="0">
-                <a:solidFill>
-                  <a:schemeClr val="tx1">
-                    <a:lumMod val="75000"/>
-                    <a:lumOff val="25000"/>
-                  </a:schemeClr>
-                </a:solidFill>
-                <a:latin typeface="微软雅黑" pitchFamily="34" charset="-122"/>
-                <a:ea typeface="微软雅黑" pitchFamily="34" charset="-122"/>
-              </a:rPr>
-              <a:t>DB </a:t>
+              <a:t> DB </a:t>
             </a:r>
             <a:r>
               <a:rPr lang="zh-CN" altLang="en-US" sz="3200" smtClean="0">
@@ -7129,20 +6695,7 @@
                 <a:latin typeface="微软雅黑" pitchFamily="34" charset="-122"/>
                 <a:ea typeface="微软雅黑" pitchFamily="34" charset="-122"/>
               </a:rPr>
-              <a:t>是一个基于分布式文件存储的开</a:t>
-            </a:r>
-            <a:r>
-              <a:rPr lang="zh-CN" altLang="en-US" sz="2400">
-                <a:solidFill>
-                  <a:schemeClr val="tx1">
-                    <a:lumMod val="75000"/>
-                    <a:lumOff val="25000"/>
-                  </a:schemeClr>
-                </a:solidFill>
-                <a:latin typeface="微软雅黑" pitchFamily="34" charset="-122"/>
-                <a:ea typeface="微软雅黑" pitchFamily="34" charset="-122"/>
-              </a:rPr>
-              <a:t>源</a:t>
+              <a:t>是一个基于分布式文件存储的开源</a:t>
             </a:r>
             <a:r>
               <a:rPr lang="zh-CN" altLang="en-US" sz="2400" smtClean="0">
@@ -7211,20 +6764,7 @@
                 <a:latin typeface="微软雅黑" pitchFamily="34" charset="-122"/>
                 <a:ea typeface="微软雅黑" pitchFamily="34" charset="-122"/>
               </a:rPr>
-              <a:t>应用提供可扩展的高性能数据存储</a:t>
-            </a:r>
-            <a:r>
-              <a:rPr lang="zh-CN" altLang="en-US" sz="2400">
-                <a:solidFill>
-                  <a:schemeClr val="tx1">
-                    <a:lumMod val="75000"/>
-                    <a:lumOff val="25000"/>
-                  </a:schemeClr>
-                </a:solidFill>
-                <a:latin typeface="微软雅黑" pitchFamily="34" charset="-122"/>
-                <a:ea typeface="微软雅黑" pitchFamily="34" charset="-122"/>
-              </a:rPr>
-              <a:t>解决</a:t>
+              <a:t>应用提供可扩展的高性能数据存储解决</a:t>
             </a:r>
             <a:r>
               <a:rPr lang="zh-CN" altLang="en-US" sz="2400" smtClean="0">
@@ -7280,7 +6820,20 @@
                 <a:latin typeface="微软雅黑" pitchFamily="34" charset="-122"/>
                 <a:ea typeface="微软雅黑" pitchFamily="34" charset="-122"/>
               </a:rPr>
-              <a:t>高负载的情况</a:t>
+              <a:t>高负载的情况下</a:t>
+            </a:r>
+            <a:r>
+              <a:rPr lang="zh-CN" altLang="en-US" sz="2400" smtClean="0">
+                <a:solidFill>
+                  <a:schemeClr val="tx1">
+                    <a:lumMod val="75000"/>
+                    <a:lumOff val="25000"/>
+                  </a:schemeClr>
+                </a:solidFill>
+                <a:latin typeface="微软雅黑" pitchFamily="34" charset="-122"/>
+                <a:ea typeface="微软雅黑" pitchFamily="34" charset="-122"/>
+              </a:rPr>
+              <a:t>，可以添加</a:t>
             </a:r>
             <a:r>
               <a:rPr lang="zh-CN" altLang="en-US" sz="2400">
@@ -7293,46 +6846,7 @@
                 <a:latin typeface="微软雅黑" pitchFamily="34" charset="-122"/>
                 <a:ea typeface="微软雅黑" pitchFamily="34" charset="-122"/>
               </a:rPr>
-              <a:t>下</a:t>
-            </a:r>
-            <a:r>
-              <a:rPr lang="zh-CN" altLang="en-US" sz="2400" smtClean="0">
-                <a:solidFill>
-                  <a:schemeClr val="tx1">
-                    <a:lumMod val="75000"/>
-                    <a:lumOff val="25000"/>
-                  </a:schemeClr>
-                </a:solidFill>
-                <a:latin typeface="微软雅黑" pitchFamily="34" charset="-122"/>
-                <a:ea typeface="微软雅黑" pitchFamily="34" charset="-122"/>
-              </a:rPr>
-              <a:t>，可以添加</a:t>
-            </a:r>
-            <a:r>
-              <a:rPr lang="zh-CN" altLang="en-US" sz="2400">
-                <a:solidFill>
-                  <a:schemeClr val="tx1">
-                    <a:lumMod val="75000"/>
-                    <a:lumOff val="25000"/>
-                  </a:schemeClr>
-                </a:solidFill>
-                <a:latin typeface="微软雅黑" pitchFamily="34" charset="-122"/>
-                <a:ea typeface="微软雅黑" pitchFamily="34" charset="-122"/>
-              </a:rPr>
-              <a:t>更多</a:t>
-            </a:r>
-            <a:r>
-              <a:rPr lang="zh-CN" altLang="en-US" sz="2400">
-                <a:solidFill>
-                  <a:schemeClr val="tx1">
-                    <a:lumMod val="75000"/>
-                    <a:lumOff val="25000"/>
-                  </a:schemeClr>
-                </a:solidFill>
-                <a:latin typeface="微软雅黑" pitchFamily="34" charset="-122"/>
-                <a:ea typeface="微软雅黑" pitchFamily="34" charset="-122"/>
-              </a:rPr>
-              <a:t>的</a:t>
+              <a:t>更多的</a:t>
             </a:r>
             <a:r>
               <a:rPr lang="zh-CN" altLang="en-US" sz="2400" smtClean="0">
@@ -7518,20 +7032,7 @@
                 <a:latin typeface="微软雅黑" pitchFamily="34" charset="-122"/>
                 <a:ea typeface="微软雅黑" pitchFamily="34" charset="-122"/>
               </a:rPr>
-              <a:t>对象。字段值可以包含其他文档，数组及</a:t>
-            </a:r>
-            <a:r>
-              <a:rPr lang="zh-CN" altLang="en-US" sz="2400">
-                <a:solidFill>
-                  <a:schemeClr val="tx1">
-                    <a:lumMod val="75000"/>
-                    <a:lumOff val="25000"/>
-                  </a:schemeClr>
-                </a:solidFill>
-                <a:latin typeface="微软雅黑" pitchFamily="34" charset="-122"/>
-                <a:ea typeface="微软雅黑" pitchFamily="34" charset="-122"/>
-              </a:rPr>
-              <a:t>文档</a:t>
+              <a:t>对象。字段值可以包含其他文档，数组及文档</a:t>
             </a:r>
             <a:r>
               <a:rPr lang="zh-CN" altLang="en-US" sz="2400" smtClean="0">
@@ -7606,7 +7107,12 @@
             <p:ph type="title"/>
           </p:nvPr>
         </p:nvSpPr>
-        <p:spPr/>
+        <p:spPr>
+          <a:xfrm>
+            <a:off x="457200" y="485800"/>
+            <a:ext cx="8229600" cy="1143000"/>
+          </a:xfrm>
+        </p:spPr>
         <p:txBody>
           <a:bodyPr>
             <a:normAutofit/>
@@ -7954,20 +7460,7 @@
                 <a:latin typeface="微软雅黑" pitchFamily="34" charset="-122"/>
                 <a:ea typeface="微软雅黑" pitchFamily="34" charset="-122"/>
               </a:rPr>
-              <a:t>命令可以实现替换完成的文档（数据）或者一些指定的数据</a:t>
-            </a:r>
-            <a:r>
-              <a:rPr lang="zh-CN" altLang="en-US" sz="2400">
-                <a:solidFill>
-                  <a:schemeClr val="tx1">
-                    <a:lumMod val="75000"/>
-                    <a:lumOff val="25000"/>
-                  </a:schemeClr>
-                </a:solidFill>
-                <a:latin typeface="微软雅黑" pitchFamily="34" charset="-122"/>
-                <a:ea typeface="微软雅黑" pitchFamily="34" charset="-122"/>
-              </a:rPr>
-              <a:t>字段</a:t>
+              <a:t>命令可以实现替换完成的文档（数据）或者一些指定的数据字段</a:t>
             </a:r>
             <a:endParaRPr lang="en-US" altLang="zh-CN" sz="2400">
               <a:solidFill>
@@ -8072,7 +7565,12 @@
             <p:ph type="title"/>
           </p:nvPr>
         </p:nvSpPr>
-        <p:spPr/>
+        <p:spPr>
+          <a:xfrm>
+            <a:off x="457200" y="485800"/>
+            <a:ext cx="8229600" cy="1143000"/>
+          </a:xfrm>
+        </p:spPr>
         <p:txBody>
           <a:bodyPr>
             <a:normAutofit/>
@@ -8105,20 +7603,7 @@
                 <a:latin typeface="微软雅黑" pitchFamily="34" charset="-122"/>
                 <a:ea typeface="微软雅黑" pitchFamily="34" charset="-122"/>
               </a:rPr>
-              <a:t> </a:t>
-            </a:r>
-            <a:r>
-              <a:rPr lang="en-US" altLang="zh-CN" sz="3200" smtClean="0">
-                <a:solidFill>
-                  <a:schemeClr val="tx1">
-                    <a:lumMod val="75000"/>
-                    <a:lumOff val="25000"/>
-                  </a:schemeClr>
-                </a:solidFill>
-                <a:latin typeface="微软雅黑" pitchFamily="34" charset="-122"/>
-                <a:ea typeface="微软雅黑" pitchFamily="34" charset="-122"/>
-              </a:rPr>
-              <a:t>DB </a:t>
+              <a:t> DB </a:t>
             </a:r>
             <a:r>
               <a:rPr lang="zh-CN" altLang="en-US" sz="3200" smtClean="0">
@@ -8210,20 +7695,7 @@
                 <a:latin typeface="微软雅黑" pitchFamily="34" charset="-122"/>
                 <a:ea typeface="微软雅黑" pitchFamily="34" charset="-122"/>
               </a:rPr>
-              <a:t>官</a:t>
-            </a:r>
-            <a:r>
-              <a:rPr lang="zh-CN" altLang="en-US" sz="2400">
-                <a:solidFill>
-                  <a:schemeClr val="tx1">
-                    <a:lumMod val="75000"/>
-                    <a:lumOff val="25000"/>
-                  </a:schemeClr>
-                </a:solidFill>
-                <a:latin typeface="微软雅黑" pitchFamily="34" charset="-122"/>
-                <a:ea typeface="微软雅黑" pitchFamily="34" charset="-122"/>
-              </a:rPr>
-              <a:t>网</a:t>
+              <a:t>官网</a:t>
             </a:r>
             <a:r>
               <a:rPr lang="zh-CN" altLang="en-US" sz="2400" smtClean="0">
@@ -8441,20 +7913,7 @@
                 <a:latin typeface="微软雅黑" pitchFamily="34" charset="-122"/>
                 <a:ea typeface="微软雅黑" pitchFamily="34" charset="-122"/>
               </a:rPr>
-              <a:t>-O https</a:t>
-            </a:r>
-            <a:r>
-              <a:rPr lang="en-US" altLang="zh-CN" sz="2000">
-                <a:solidFill>
-                  <a:schemeClr val="tx1">
-                    <a:lumMod val="75000"/>
-                    <a:lumOff val="25000"/>
-                  </a:schemeClr>
-                </a:solidFill>
-                <a:latin typeface="微软雅黑" pitchFamily="34" charset="-122"/>
-                <a:ea typeface="微软雅黑" pitchFamily="34" charset="-122"/>
-              </a:rPr>
-              <a:t>://</a:t>
+              <a:t>-O https://</a:t>
             </a:r>
             <a:r>
               <a:rPr lang="en-US" altLang="zh-CN" sz="2000" smtClean="0">
@@ -8501,20 +7960,7 @@
                 <a:latin typeface="微软雅黑" pitchFamily="34" charset="-122"/>
                 <a:ea typeface="微软雅黑" pitchFamily="34" charset="-122"/>
               </a:rPr>
-              <a:t>-</a:t>
-            </a:r>
-            <a:r>
-              <a:rPr lang="en-US" altLang="zh-CN" sz="2000">
-                <a:solidFill>
-                  <a:schemeClr val="tx1">
-                    <a:lumMod val="75000"/>
-                    <a:lumOff val="25000"/>
-                  </a:schemeClr>
-                </a:solidFill>
-                <a:latin typeface="微软雅黑" pitchFamily="34" charset="-122"/>
-                <a:ea typeface="微软雅黑" pitchFamily="34" charset="-122"/>
-              </a:rPr>
-              <a:t>zxvf </a:t>
+              <a:t>-zxvf </a:t>
             </a:r>
             <a:r>
               <a:rPr lang="en-US" altLang="zh-CN" sz="2000" smtClean="0">
@@ -8809,7 +8255,12 @@
             <p:ph type="title"/>
           </p:nvPr>
         </p:nvSpPr>
-        <p:spPr/>
+        <p:spPr>
+          <a:xfrm>
+            <a:off x="457200" y="341784"/>
+            <a:ext cx="8229600" cy="1143000"/>
+          </a:xfrm>
+        </p:spPr>
         <p:txBody>
           <a:bodyPr>
             <a:normAutofit/>
@@ -8842,20 +8293,7 @@
                 <a:latin typeface="微软雅黑" pitchFamily="34" charset="-122"/>
                 <a:ea typeface="微软雅黑" pitchFamily="34" charset="-122"/>
               </a:rPr>
-              <a:t> </a:t>
-            </a:r>
-            <a:r>
-              <a:rPr lang="en-US" altLang="zh-CN" sz="3200" smtClean="0">
-                <a:solidFill>
-                  <a:schemeClr val="tx1">
-                    <a:lumMod val="75000"/>
-                    <a:lumOff val="25000"/>
-                  </a:schemeClr>
-                </a:solidFill>
-                <a:latin typeface="微软雅黑" pitchFamily="34" charset="-122"/>
-                <a:ea typeface="微软雅黑" pitchFamily="34" charset="-122"/>
-              </a:rPr>
-              <a:t>DB </a:t>
+              <a:t> DB </a:t>
             </a:r>
             <a:r>
               <a:rPr lang="zh-CN" altLang="en-US" sz="3200" smtClean="0">
@@ -8893,13 +8331,13 @@
             <p:ph idx="1"/>
             <p:extLst>
               <p:ext uri="{D42A27DB-BD31-4B8C-83A1-F6EECF244321}">
-                <p14:modId xmlns:p14="http://schemas.microsoft.com/office/powerpoint/2010/main" val="1959908560"/>
+                <p14:modId xmlns:p14="http://schemas.microsoft.com/office/powerpoint/2010/main" val="3693471575"/>
               </p:ext>
             </p:extLst>
           </p:nvPr>
         </p:nvGraphicFramePr>
         <p:xfrm>
-          <a:off x="457200" y="1268760"/>
+          <a:off x="590872" y="1413446"/>
           <a:ext cx="8229600" cy="5327922"/>
         </p:xfrm>
         <a:graphic>
@@ -9527,7 +8965,12 @@
             <p:ph type="title"/>
           </p:nvPr>
         </p:nvSpPr>
-        <p:spPr/>
+        <p:spPr>
+          <a:xfrm>
+            <a:off x="457200" y="404664"/>
+            <a:ext cx="8229600" cy="1143000"/>
+          </a:xfrm>
+        </p:spPr>
         <p:txBody>
           <a:bodyPr>
             <a:normAutofit/>
@@ -9560,20 +9003,7 @@
                 <a:latin typeface="微软雅黑" pitchFamily="34" charset="-122"/>
                 <a:ea typeface="微软雅黑" pitchFamily="34" charset="-122"/>
               </a:rPr>
-              <a:t> </a:t>
-            </a:r>
-            <a:r>
-              <a:rPr lang="en-US" altLang="zh-CN" sz="3200" smtClean="0">
-                <a:solidFill>
-                  <a:schemeClr val="tx1">
-                    <a:lumMod val="75000"/>
-                    <a:lumOff val="25000"/>
-                  </a:schemeClr>
-                </a:solidFill>
-                <a:latin typeface="微软雅黑" pitchFamily="34" charset="-122"/>
-                <a:ea typeface="微软雅黑" pitchFamily="34" charset="-122"/>
-              </a:rPr>
-              <a:t>DB </a:t>
+              <a:t> DB </a:t>
             </a:r>
             <a:r>
               <a:rPr lang="zh-CN" altLang="en-US" sz="3200" smtClean="0">
@@ -9848,7 +9278,12 @@
             <p:ph type="title"/>
           </p:nvPr>
         </p:nvSpPr>
-        <p:spPr/>
+        <p:spPr>
+          <a:xfrm>
+            <a:off x="457200" y="413792"/>
+            <a:ext cx="8229600" cy="1143000"/>
+          </a:xfrm>
+        </p:spPr>
         <p:txBody>
           <a:bodyPr>
             <a:normAutofit/>
@@ -9881,20 +9316,7 @@
                 <a:latin typeface="微软雅黑" pitchFamily="34" charset="-122"/>
                 <a:ea typeface="微软雅黑" pitchFamily="34" charset="-122"/>
               </a:rPr>
-              <a:t> </a:t>
-            </a:r>
-            <a:r>
-              <a:rPr lang="en-US" altLang="zh-CN" sz="3200" smtClean="0">
-                <a:solidFill>
-                  <a:schemeClr val="tx1">
-                    <a:lumMod val="75000"/>
-                    <a:lumOff val="25000"/>
-                  </a:schemeClr>
-                </a:solidFill>
-                <a:latin typeface="微软雅黑" pitchFamily="34" charset="-122"/>
-                <a:ea typeface="微软雅黑" pitchFamily="34" charset="-122"/>
-              </a:rPr>
-              <a:t>DB </a:t>
+              <a:t> DB </a:t>
             </a:r>
             <a:r>
               <a:rPr lang="zh-CN" altLang="en-US" sz="3200" smtClean="0">
@@ -9993,11 +9415,7 @@
             </a:r>
             <a:r>
               <a:rPr lang="en-US" altLang="zh-CN" sz="2200"/>
-              <a:t>mongodb://[username:password@]host1[:port1][,host2[:port2],...[,hostN[:portN]]][/[database][?</a:t>
-            </a:r>
-            <a:r>
-              <a:rPr lang="en-US" altLang="zh-CN" sz="2200"/>
-              <a:t>options</a:t>
+              <a:t>mongodb://[username:password@]host1[:port1][,host2[:port2],...[,hostN[:portN]]][/[database][?options</a:t>
             </a:r>
             <a:r>
               <a:rPr lang="en-US" altLang="zh-CN" sz="2200" smtClean="0"/>
@@ -10136,7 +9554,33 @@
                 <a:latin typeface="微软雅黑" pitchFamily="34" charset="-122"/>
                 <a:ea typeface="微软雅黑" pitchFamily="34" charset="-122"/>
               </a:rPr>
-              <a:t>host1</a:t>
+              <a:t>host1 </a:t>
+            </a:r>
+            <a:r>
+              <a:rPr lang="zh-CN" altLang="en-US" sz="1500" smtClean="0">
+                <a:solidFill>
+                  <a:schemeClr val="tx1">
+                    <a:lumMod val="75000"/>
+                    <a:lumOff val="25000"/>
+                  </a:schemeClr>
+                </a:solidFill>
+                <a:latin typeface="微软雅黑" pitchFamily="34" charset="-122"/>
+                <a:ea typeface="微软雅黑" pitchFamily="34" charset="-122"/>
+              </a:rPr>
+              <a:t>必须指定</a:t>
+            </a:r>
+            <a:r>
+              <a:rPr lang="zh-CN" altLang="en-US" sz="1500">
+                <a:solidFill>
+                  <a:schemeClr val="tx1">
+                    <a:lumMod val="75000"/>
+                    <a:lumOff val="25000"/>
+                  </a:schemeClr>
+                </a:solidFill>
+                <a:latin typeface="微软雅黑" pitchFamily="34" charset="-122"/>
+                <a:ea typeface="微软雅黑" pitchFamily="34" charset="-122"/>
+              </a:rPr>
+              <a:t>至少一个</a:t>
             </a:r>
             <a:r>
               <a:rPr lang="en-US" altLang="zh-CN" sz="1500">
@@ -10149,7 +9593,33 @@
                 <a:latin typeface="微软雅黑" pitchFamily="34" charset="-122"/>
                 <a:ea typeface="微软雅黑" pitchFamily="34" charset="-122"/>
               </a:rPr>
-              <a:t> </a:t>
+              <a:t>host, host1 </a:t>
+            </a:r>
+            <a:r>
+              <a:rPr lang="zh-CN" altLang="en-US" sz="1500">
+                <a:solidFill>
+                  <a:schemeClr val="tx1">
+                    <a:lumMod val="75000"/>
+                    <a:lumOff val="25000"/>
+                  </a:schemeClr>
+                </a:solidFill>
+                <a:latin typeface="微软雅黑" pitchFamily="34" charset="-122"/>
+                <a:ea typeface="微软雅黑" pitchFamily="34" charset="-122"/>
+              </a:rPr>
+              <a:t>是这个</a:t>
+            </a:r>
+            <a:r>
+              <a:rPr lang="en-US" altLang="zh-CN" sz="1500">
+                <a:solidFill>
+                  <a:schemeClr val="tx1">
+                    <a:lumMod val="75000"/>
+                    <a:lumOff val="25000"/>
+                  </a:schemeClr>
+                </a:solidFill>
+                <a:latin typeface="微软雅黑" pitchFamily="34" charset="-122"/>
+                <a:ea typeface="微软雅黑" pitchFamily="34" charset="-122"/>
+              </a:rPr>
+              <a:t>URI</a:t>
             </a:r>
             <a:r>
               <a:rPr lang="zh-CN" altLang="en-US" sz="1500" smtClean="0">
@@ -10162,7 +9632,7 @@
                 <a:latin typeface="微软雅黑" pitchFamily="34" charset="-122"/>
                 <a:ea typeface="微软雅黑" pitchFamily="34" charset="-122"/>
               </a:rPr>
-              <a:t>必须指定</a:t>
+              <a:t>唯一必须要</a:t>
             </a:r>
             <a:r>
               <a:rPr lang="zh-CN" altLang="en-US" sz="1500">
@@ -10175,20 +9645,20 @@
                 <a:latin typeface="微软雅黑" pitchFamily="34" charset="-122"/>
                 <a:ea typeface="微软雅黑" pitchFamily="34" charset="-122"/>
               </a:rPr>
-              <a:t>至少一个</a:t>
-            </a:r>
-            <a:r>
-              <a:rPr lang="en-US" altLang="zh-CN" sz="1500">
-                <a:solidFill>
-                  <a:schemeClr val="tx1">
-                    <a:lumMod val="75000"/>
-                    <a:lumOff val="25000"/>
-                  </a:schemeClr>
-                </a:solidFill>
-                <a:latin typeface="微软雅黑" pitchFamily="34" charset="-122"/>
-                <a:ea typeface="微软雅黑" pitchFamily="34" charset="-122"/>
-              </a:rPr>
-              <a:t>host, host1 </a:t>
+              <a:t>填写</a:t>
+            </a:r>
+            <a:r>
+              <a:rPr lang="zh-CN" altLang="en-US" sz="1500" smtClean="0">
+                <a:solidFill>
+                  <a:schemeClr val="tx1">
+                    <a:lumMod val="75000"/>
+                    <a:lumOff val="25000"/>
+                  </a:schemeClr>
+                </a:solidFill>
+                <a:latin typeface="微软雅黑" pitchFamily="34" charset="-122"/>
+                <a:ea typeface="微软雅黑" pitchFamily="34" charset="-122"/>
+              </a:rPr>
+              <a:t>的，它</a:t>
             </a:r>
             <a:r>
               <a:rPr lang="zh-CN" altLang="en-US" sz="1500">
@@ -10201,85 +9671,7 @@
                 <a:latin typeface="微软雅黑" pitchFamily="34" charset="-122"/>
                 <a:ea typeface="微软雅黑" pitchFamily="34" charset="-122"/>
               </a:rPr>
-              <a:t>是这个</a:t>
-            </a:r>
-            <a:r>
-              <a:rPr lang="en-US" altLang="zh-CN" sz="1500">
-                <a:solidFill>
-                  <a:schemeClr val="tx1">
-                    <a:lumMod val="75000"/>
-                    <a:lumOff val="25000"/>
-                  </a:schemeClr>
-                </a:solidFill>
-                <a:latin typeface="微软雅黑" pitchFamily="34" charset="-122"/>
-                <a:ea typeface="微软雅黑" pitchFamily="34" charset="-122"/>
-              </a:rPr>
-              <a:t>URI</a:t>
-            </a:r>
-            <a:r>
-              <a:rPr lang="zh-CN" altLang="en-US" sz="1500" smtClean="0">
-                <a:solidFill>
-                  <a:schemeClr val="tx1">
-                    <a:lumMod val="75000"/>
-                    <a:lumOff val="25000"/>
-                  </a:schemeClr>
-                </a:solidFill>
-                <a:latin typeface="微软雅黑" pitchFamily="34" charset="-122"/>
-                <a:ea typeface="微软雅黑" pitchFamily="34" charset="-122"/>
-              </a:rPr>
-              <a:t>唯一必须要</a:t>
-            </a:r>
-            <a:r>
-              <a:rPr lang="zh-CN" altLang="en-US" sz="1500">
-                <a:solidFill>
-                  <a:schemeClr val="tx1">
-                    <a:lumMod val="75000"/>
-                    <a:lumOff val="25000"/>
-                  </a:schemeClr>
-                </a:solidFill>
-                <a:latin typeface="微软雅黑" pitchFamily="34" charset="-122"/>
-                <a:ea typeface="微软雅黑" pitchFamily="34" charset="-122"/>
-              </a:rPr>
-              <a:t>填写</a:t>
-            </a:r>
-            <a:r>
-              <a:rPr lang="zh-CN" altLang="en-US" sz="1500" smtClean="0">
-                <a:solidFill>
-                  <a:schemeClr val="tx1">
-                    <a:lumMod val="75000"/>
-                    <a:lumOff val="25000"/>
-                  </a:schemeClr>
-                </a:solidFill>
-                <a:latin typeface="微软雅黑" pitchFamily="34" charset="-122"/>
-                <a:ea typeface="微软雅黑" pitchFamily="34" charset="-122"/>
-              </a:rPr>
-              <a:t>的，它</a:t>
-            </a:r>
-            <a:r>
-              <a:rPr lang="zh-CN" altLang="en-US" sz="1500">
-                <a:solidFill>
-                  <a:schemeClr val="tx1">
-                    <a:lumMod val="75000"/>
-                    <a:lumOff val="25000"/>
-                  </a:schemeClr>
-                </a:solidFill>
-                <a:latin typeface="微软雅黑" pitchFamily="34" charset="-122"/>
-                <a:ea typeface="微软雅黑" pitchFamily="34" charset="-122"/>
-              </a:rPr>
-              <a:t>指定了要连接服务器的地址。如果要连接复制</a:t>
-            </a:r>
-            <a:r>
-              <a:rPr lang="zh-CN" altLang="en-US" sz="1500">
-                <a:solidFill>
-                  <a:schemeClr val="tx1">
-                    <a:lumMod val="75000"/>
-                    <a:lumOff val="25000"/>
-                  </a:schemeClr>
-                </a:solidFill>
-                <a:latin typeface="微软雅黑" pitchFamily="34" charset="-122"/>
-                <a:ea typeface="微软雅黑" pitchFamily="34" charset="-122"/>
-              </a:rPr>
-              <a:t>集</a:t>
+              <a:t>指定了要连接服务器的地址。如果要连接复制集</a:t>
             </a:r>
             <a:r>
               <a:rPr lang="zh-CN" altLang="en-US" sz="1500" smtClean="0">
@@ -10351,20 +9743,7 @@
                 <a:latin typeface="微软雅黑" pitchFamily="34" charset="-122"/>
                 <a:ea typeface="微软雅黑" pitchFamily="34" charset="-122"/>
               </a:rPr>
-              <a:t>可选的指定端口，如果不填，默认</a:t>
-            </a:r>
-            <a:r>
-              <a:rPr lang="zh-CN" altLang="en-US" sz="1500">
-                <a:solidFill>
-                  <a:schemeClr val="tx1">
-                    <a:lumMod val="75000"/>
-                    <a:lumOff val="25000"/>
-                  </a:schemeClr>
-                </a:solidFill>
-                <a:latin typeface="微软雅黑" pitchFamily="34" charset="-122"/>
-                <a:ea typeface="微软雅黑" pitchFamily="34" charset="-122"/>
-              </a:rPr>
-              <a:t>为</a:t>
+              <a:t>可选的指定端口，如果不填，默认为</a:t>
             </a:r>
             <a:r>
               <a:rPr lang="en-US" altLang="zh-CN" sz="1500" smtClean="0">
@@ -10500,16 +9879,6 @@
               </a:rPr>
               <a:t>。</a:t>
             </a:r>
-            <a:endParaRPr lang="zh-CN" altLang="en-US" sz="1500">
-              <a:solidFill>
-                <a:schemeClr val="tx1">
-                  <a:lumMod val="75000"/>
-                  <a:lumOff val="25000"/>
-                </a:schemeClr>
-              </a:solidFill>
-              <a:latin typeface="微软雅黑" pitchFamily="34" charset="-122"/>
-              <a:ea typeface="微软雅黑" pitchFamily="34" charset="-122"/>
-            </a:endParaRPr>
           </a:p>
           <a:p>
             <a:pPr lvl="1" latinLnBrk="1">
@@ -10528,20 +9897,7 @@
                 <a:latin typeface="微软雅黑" pitchFamily="34" charset="-122"/>
                 <a:ea typeface="微软雅黑" pitchFamily="34" charset="-122"/>
               </a:rPr>
-              <a:t>?options</a:t>
-            </a:r>
-            <a:r>
-              <a:rPr lang="en-US" altLang="zh-CN" sz="1500">
-                <a:solidFill>
-                  <a:schemeClr val="tx1">
-                    <a:lumMod val="75000"/>
-                    <a:lumOff val="25000"/>
-                  </a:schemeClr>
-                </a:solidFill>
-                <a:latin typeface="微软雅黑" pitchFamily="34" charset="-122"/>
-                <a:ea typeface="微软雅黑" pitchFamily="34" charset="-122"/>
-              </a:rPr>
-              <a:t> </a:t>
+              <a:t>?options </a:t>
             </a:r>
             <a:r>
               <a:rPr lang="zh-CN" altLang="en-US" sz="1500" smtClean="0">
@@ -10693,7 +10049,12 @@
             <p:ph type="title"/>
           </p:nvPr>
         </p:nvSpPr>
-        <p:spPr/>
+        <p:spPr>
+          <a:xfrm>
+            <a:off x="457200" y="485800"/>
+            <a:ext cx="8229600" cy="1143000"/>
+          </a:xfrm>
+        </p:spPr>
         <p:txBody>
           <a:bodyPr>
             <a:normAutofit/>
@@ -10970,20 +10331,7 @@
                 <a:latin typeface="微软雅黑" pitchFamily="34" charset="-122"/>
                 <a:ea typeface="微软雅黑" pitchFamily="34" charset="-122"/>
               </a:rPr>
-              <a:t>连接到</a:t>
-            </a:r>
-            <a:r>
-              <a:rPr lang="zh-CN" altLang="en-US" sz="2400">
-                <a:solidFill>
-                  <a:schemeClr val="tx1">
-                    <a:lumMod val="75000"/>
-                    <a:lumOff val="25000"/>
-                  </a:schemeClr>
-                </a:solidFill>
-                <a:latin typeface="微软雅黑" pitchFamily="34" charset="-122"/>
-                <a:ea typeface="微软雅黑" pitchFamily="34" charset="-122"/>
-              </a:rPr>
-              <a:t>指定</a:t>
+              <a:t>连接到指定</a:t>
             </a:r>
             <a:r>
               <a:rPr lang="zh-CN" altLang="en-US" sz="2400" smtClean="0">
@@ -11178,7 +10526,12 @@
             <p:ph type="title"/>
           </p:nvPr>
         </p:nvSpPr>
-        <p:spPr/>
+        <p:spPr>
+          <a:xfrm>
+            <a:off x="457200" y="413792"/>
+            <a:ext cx="8229600" cy="1143000"/>
+          </a:xfrm>
+        </p:spPr>
         <p:txBody>
           <a:bodyPr>
             <a:normAutofit/>
@@ -11198,21 +10551,7 @@
                 <a:ea typeface="微软雅黑" pitchFamily="34" charset="-122"/>
                 <a:cs typeface="+mn-cs"/>
               </a:rPr>
-              <a:t>  </a:t>
-            </a:r>
-            <a:r>
-              <a:rPr lang="zh-CN" altLang="en-US" sz="3200" smtClean="0">
-                <a:solidFill>
-                  <a:schemeClr val="tx1">
-                    <a:lumMod val="75000"/>
-                    <a:lumOff val="25000"/>
-                  </a:schemeClr>
-                </a:solidFill>
-                <a:latin typeface="微软雅黑" pitchFamily="34" charset="-122"/>
-                <a:ea typeface="微软雅黑" pitchFamily="34" charset="-122"/>
-                <a:cs typeface="+mn-cs"/>
-              </a:rPr>
-              <a:t>集合 </a:t>
+              <a:t>  集合 </a:t>
             </a:r>
             <a:r>
               <a:rPr lang="en-US" altLang="zh-CN" sz="3200" smtClean="0">
@@ -11446,33 +10785,7 @@
                 <a:latin typeface="微软雅黑" pitchFamily="34" charset="-122"/>
                 <a:ea typeface="微软雅黑" pitchFamily="34" charset="-122"/>
               </a:rPr>
-              <a:t>db.</a:t>
-            </a:r>
-            <a:r>
-              <a:rPr lang="en-US" altLang="zh-CN" sz="2400">
-                <a:solidFill>
-                  <a:schemeClr val="tx1">
-                    <a:lumMod val="75000"/>
-                    <a:lumOff val="25000"/>
-                  </a:schemeClr>
-                </a:solidFill>
-                <a:latin typeface="微软雅黑" pitchFamily="34" charset="-122"/>
-                <a:ea typeface="微软雅黑" pitchFamily="34" charset="-122"/>
-              </a:rPr>
-              <a:t> COLLECTION_NAME</a:t>
-            </a:r>
-            <a:r>
-              <a:rPr lang="en-US" altLang="zh-CN" sz="2400">
-                <a:solidFill>
-                  <a:schemeClr val="tx1">
-                    <a:lumMod val="75000"/>
-                    <a:lumOff val="25000"/>
-                  </a:schemeClr>
-                </a:solidFill>
-                <a:latin typeface="微软雅黑" pitchFamily="34" charset="-122"/>
-                <a:ea typeface="微软雅黑" pitchFamily="34" charset="-122"/>
-              </a:rPr>
-              <a:t>.drop</a:t>
+              <a:t>db. COLLECTION_NAME.drop</a:t>
             </a:r>
             <a:r>
               <a:rPr lang="en-US" altLang="zh-CN" sz="2400" smtClean="0">

</xml_diff>